<commit_message>
Updates to readme and powerpoint
</commit_message>
<xml_diff>
--- a/Gamepad Driver.pptx
+++ b/Gamepad Driver.pptx
@@ -798,7 +798,7 @@
           <a:p>
             <a:fld id="{016554A5-B4DD-7045-B047-B7DA6D1E70A4}" type="datetimeFigureOut">
               <a:rPr lang="en-US" smtClean="0"/>
-              <a:t>4/28/2022</a:t>
+              <a:t>4/29/2022</a:t>
             </a:fld>
             <a:endParaRPr lang="en-US"/>
           </a:p>
@@ -1086,7 +1086,7 @@
           <a:p>
             <a:fld id="{016554A5-B4DD-7045-B047-B7DA6D1E70A4}" type="datetimeFigureOut">
               <a:rPr lang="en-US" smtClean="0"/>
-              <a:t>4/28/2022</a:t>
+              <a:t>4/29/2022</a:t>
             </a:fld>
             <a:endParaRPr lang="en-US"/>
           </a:p>
@@ -1284,7 +1284,7 @@
           <a:p>
             <a:fld id="{016554A5-B4DD-7045-B047-B7DA6D1E70A4}" type="datetimeFigureOut">
               <a:rPr lang="en-US" smtClean="0"/>
-              <a:t>4/28/2022</a:t>
+              <a:t>4/29/2022</a:t>
             </a:fld>
             <a:endParaRPr lang="en-US"/>
           </a:p>
@@ -1492,7 +1492,7 @@
           <a:p>
             <a:fld id="{016554A5-B4DD-7045-B047-B7DA6D1E70A4}" type="datetimeFigureOut">
               <a:rPr lang="en-US" smtClean="0"/>
-              <a:t>4/28/2022</a:t>
+              <a:t>4/29/2022</a:t>
             </a:fld>
             <a:endParaRPr lang="en-US"/>
           </a:p>
@@ -1969,7 +1969,7 @@
           <a:p>
             <a:fld id="{016554A5-B4DD-7045-B047-B7DA6D1E70A4}" type="datetimeFigureOut">
               <a:rPr lang="en-US" smtClean="0"/>
-              <a:t>4/28/2022</a:t>
+              <a:t>4/29/2022</a:t>
             </a:fld>
             <a:endParaRPr lang="en-US"/>
           </a:p>
@@ -2282,7 +2282,7 @@
           <a:p>
             <a:fld id="{016554A5-B4DD-7045-B047-B7DA6D1E70A4}" type="datetimeFigureOut">
               <a:rPr lang="en-US" smtClean="0"/>
-              <a:t>4/28/2022</a:t>
+              <a:t>4/29/2022</a:t>
             </a:fld>
             <a:endParaRPr lang="en-US"/>
           </a:p>
@@ -2490,7 +2490,7 @@
           <a:p>
             <a:fld id="{016554A5-B4DD-7045-B047-B7DA6D1E70A4}" type="datetimeFigureOut">
               <a:rPr lang="en-US" smtClean="0"/>
-              <a:t>4/28/2022</a:t>
+              <a:t>4/29/2022</a:t>
             </a:fld>
             <a:endParaRPr lang="en-US"/>
           </a:p>
@@ -2793,7 +2793,7 @@
           <a:p>
             <a:fld id="{016554A5-B4DD-7045-B047-B7DA6D1E70A4}" type="datetimeFigureOut">
               <a:rPr lang="en-US" smtClean="0"/>
-              <a:t>4/28/2022</a:t>
+              <a:t>4/29/2022</a:t>
             </a:fld>
             <a:endParaRPr lang="en-US"/>
           </a:p>
@@ -3172,7 +3172,7 @@
           <a:p>
             <a:fld id="{016554A5-B4DD-7045-B047-B7DA6D1E70A4}" type="datetimeFigureOut">
               <a:rPr lang="en-US" smtClean="0"/>
-              <a:t>4/28/2022</a:t>
+              <a:t>4/29/2022</a:t>
             </a:fld>
             <a:endParaRPr lang="en-US"/>
           </a:p>
@@ -3351,7 +3351,7 @@
           <a:p>
             <a:fld id="{016554A5-B4DD-7045-B047-B7DA6D1E70A4}" type="datetimeFigureOut">
               <a:rPr lang="en-US" smtClean="0"/>
-              <a:t>4/28/2022</a:t>
+              <a:t>4/29/2022</a:t>
             </a:fld>
             <a:endParaRPr lang="en-US"/>
           </a:p>
@@ -3464,7 +3464,7 @@
           <a:p>
             <a:fld id="{016554A5-B4DD-7045-B047-B7DA6D1E70A4}" type="datetimeFigureOut">
               <a:rPr lang="en-US" smtClean="0"/>
-              <a:t>4/28/2022</a:t>
+              <a:t>4/29/2022</a:t>
             </a:fld>
             <a:endParaRPr lang="en-US"/>
           </a:p>
@@ -4012,7 +4012,7 @@
           <a:p>
             <a:fld id="{016554A5-B4DD-7045-B047-B7DA6D1E70A4}" type="datetimeFigureOut">
               <a:rPr lang="en-US" smtClean="0"/>
-              <a:t>4/28/2022</a:t>
+              <a:t>4/29/2022</a:t>
             </a:fld>
             <a:endParaRPr lang="en-US"/>
           </a:p>
@@ -5160,56 +5160,64 @@
           </a:p>
         </p:txBody>
       </p:sp>
-      <p:sp>
-        <p:nvSpPr>
-          <p:cNvPr id="2" name="Content Placeholder 1">
-            <a:extLst>
-              <a:ext uri="{FF2B5EF4-FFF2-40B4-BE49-F238E27FC236}">
-                <a16:creationId xmlns:a16="http://schemas.microsoft.com/office/drawing/2014/main" id="{E4968165-2C30-4116-AF7B-E1248340D0B7}"/>
-              </a:ext>
-            </a:extLst>
-          </p:cNvPr>
-          <p:cNvSpPr>
-            <a:spLocks noGrp="1"/>
-          </p:cNvSpPr>
+      <p:pic>
+        <p:nvPicPr>
+          <p:cNvPr id="6" name="Content Placeholder 5">
+            <a:extLst>
+              <a:ext uri="{FF2B5EF4-FFF2-40B4-BE49-F238E27FC236}">
+                <a16:creationId xmlns:a16="http://schemas.microsoft.com/office/drawing/2014/main" id="{8E0825E2-47C3-4953-B635-0B41FAB9FCD9}"/>
+              </a:ext>
+            </a:extLst>
+          </p:cNvPr>
+          <p:cNvPicPr>
+            <a:picLocks noGrp="1" noChangeAspect="1"/>
+          </p:cNvPicPr>
           <p:nvPr>
             <p:ph sz="half" idx="1"/>
           </p:nvPr>
-        </p:nvSpPr>
-        <p:spPr/>
-        <p:txBody>
-          <a:bodyPr/>
-          <a:lstStyle/>
-          <a:p>
-            <a:endParaRPr lang="en-US"/>
-          </a:p>
-        </p:txBody>
-      </p:sp>
-      <p:sp>
-        <p:nvSpPr>
-          <p:cNvPr id="3" name="Content Placeholder 2">
-            <a:extLst>
-              <a:ext uri="{FF2B5EF4-FFF2-40B4-BE49-F238E27FC236}">
-                <a16:creationId xmlns:a16="http://schemas.microsoft.com/office/drawing/2014/main" id="{276F6504-77FF-4BC5-AFA1-C38014F97D6A}"/>
-              </a:ext>
-            </a:extLst>
-          </p:cNvPr>
-          <p:cNvSpPr>
-            <a:spLocks noGrp="1"/>
-          </p:cNvSpPr>
+        </p:nvPicPr>
+        <p:blipFill>
+          <a:blip r:embed="rId2"/>
+          <a:stretch>
+            <a:fillRect/>
+          </a:stretch>
+        </p:blipFill>
+        <p:spPr>
+          <a:xfrm>
+            <a:off x="284163" y="1906365"/>
+            <a:ext cx="4211637" cy="3580258"/>
+          </a:xfrm>
+        </p:spPr>
+      </p:pic>
+      <p:pic>
+        <p:nvPicPr>
+          <p:cNvPr id="8" name="Content Placeholder 7">
+            <a:extLst>
+              <a:ext uri="{FF2B5EF4-FFF2-40B4-BE49-F238E27FC236}">
+                <a16:creationId xmlns:a16="http://schemas.microsoft.com/office/drawing/2014/main" id="{6705251F-FD4D-4DA2-AFCB-BA5C3911A102}"/>
+              </a:ext>
+            </a:extLst>
+          </p:cNvPr>
+          <p:cNvPicPr>
+            <a:picLocks noGrp="1" noChangeAspect="1"/>
+          </p:cNvPicPr>
           <p:nvPr>
             <p:ph sz="half" idx="2"/>
           </p:nvPr>
-        </p:nvSpPr>
-        <p:spPr/>
-        <p:txBody>
-          <a:bodyPr/>
-          <a:lstStyle/>
-          <a:p>
-            <a:endParaRPr lang="en-US"/>
-          </a:p>
-        </p:txBody>
-      </p:sp>
+        </p:nvPicPr>
+        <p:blipFill>
+          <a:blip r:embed="rId3"/>
+          <a:stretch>
+            <a:fillRect/>
+          </a:stretch>
+        </p:blipFill>
+        <p:spPr>
+          <a:xfrm>
+            <a:off x="5185332" y="1216025"/>
+            <a:ext cx="3135785" cy="4960938"/>
+          </a:xfrm>
+        </p:spPr>
+      </p:pic>
     </p:spTree>
     <p:extLst>
       <p:ext uri="{BB962C8B-B14F-4D97-AF65-F5344CB8AC3E}">
@@ -5411,6 +5419,13 @@
             <a:r>
               <a:rPr lang="en-US" dirty="0"/>
               <a:t>Software updates/clean up</a:t>
+            </a:r>
+          </a:p>
+          <a:p>
+            <a:pPr lvl="1"/>
+            <a:r>
+              <a:rPr lang="en-US" dirty="0"/>
+              <a:t>More configurable descriptor</a:t>
             </a:r>
           </a:p>
           <a:p>

</xml_diff>

<commit_message>
Add video to demo
</commit_message>
<xml_diff>
--- a/Gamepad Driver.pptx
+++ b/Gamepad Driver.pptx
@@ -24,12 +24,12 @@
       <p:boldItalic r:id="rId12"/>
     </p:embeddedFont>
     <p:embeddedFont>
-      <p:font typeface="Roboto Condensed Light" panose="02000000000000000000" pitchFamily="2" charset="0"/>
+      <p:font typeface="Roboto Condensed Light" panose="020F0302020204030204" pitchFamily="34" charset="0"/>
       <p:regular r:id="rId13"/>
       <p:italic r:id="rId14"/>
     </p:embeddedFont>
     <p:embeddedFont>
-      <p:font typeface="Roboto Slab" panose="020B0604020202020204" charset="0"/>
+      <p:font typeface="Roboto Slab" pitchFamily="2" charset="0"/>
       <p:regular r:id="rId15"/>
       <p:bold r:id="rId16"/>
     </p:embeddedFont>
@@ -798,7 +798,7 @@
           <a:p>
             <a:fld id="{016554A5-B4DD-7045-B047-B7DA6D1E70A4}" type="datetimeFigureOut">
               <a:rPr lang="en-US" smtClean="0"/>
-              <a:t>4/29/2022</a:t>
+              <a:t>4/29/22</a:t>
             </a:fld>
             <a:endParaRPr lang="en-US"/>
           </a:p>
@@ -1086,7 +1086,7 @@
           <a:p>
             <a:fld id="{016554A5-B4DD-7045-B047-B7DA6D1E70A4}" type="datetimeFigureOut">
               <a:rPr lang="en-US" smtClean="0"/>
-              <a:t>4/29/2022</a:t>
+              <a:t>4/29/22</a:t>
             </a:fld>
             <a:endParaRPr lang="en-US"/>
           </a:p>
@@ -1284,7 +1284,7 @@
           <a:p>
             <a:fld id="{016554A5-B4DD-7045-B047-B7DA6D1E70A4}" type="datetimeFigureOut">
               <a:rPr lang="en-US" smtClean="0"/>
-              <a:t>4/29/2022</a:t>
+              <a:t>4/29/22</a:t>
             </a:fld>
             <a:endParaRPr lang="en-US"/>
           </a:p>
@@ -1492,7 +1492,7 @@
           <a:p>
             <a:fld id="{016554A5-B4DD-7045-B047-B7DA6D1E70A4}" type="datetimeFigureOut">
               <a:rPr lang="en-US" smtClean="0"/>
-              <a:t>4/29/2022</a:t>
+              <a:t>4/29/22</a:t>
             </a:fld>
             <a:endParaRPr lang="en-US"/>
           </a:p>
@@ -1969,7 +1969,7 @@
           <a:p>
             <a:fld id="{016554A5-B4DD-7045-B047-B7DA6D1E70A4}" type="datetimeFigureOut">
               <a:rPr lang="en-US" smtClean="0"/>
-              <a:t>4/29/2022</a:t>
+              <a:t>4/29/22</a:t>
             </a:fld>
             <a:endParaRPr lang="en-US"/>
           </a:p>
@@ -2282,7 +2282,7 @@
           <a:p>
             <a:fld id="{016554A5-B4DD-7045-B047-B7DA6D1E70A4}" type="datetimeFigureOut">
               <a:rPr lang="en-US" smtClean="0"/>
-              <a:t>4/29/2022</a:t>
+              <a:t>4/29/22</a:t>
             </a:fld>
             <a:endParaRPr lang="en-US"/>
           </a:p>
@@ -2490,7 +2490,7 @@
           <a:p>
             <a:fld id="{016554A5-B4DD-7045-B047-B7DA6D1E70A4}" type="datetimeFigureOut">
               <a:rPr lang="en-US" smtClean="0"/>
-              <a:t>4/29/2022</a:t>
+              <a:t>4/29/22</a:t>
             </a:fld>
             <a:endParaRPr lang="en-US"/>
           </a:p>
@@ -2793,7 +2793,7 @@
           <a:p>
             <a:fld id="{016554A5-B4DD-7045-B047-B7DA6D1E70A4}" type="datetimeFigureOut">
               <a:rPr lang="en-US" smtClean="0"/>
-              <a:t>4/29/2022</a:t>
+              <a:t>4/29/22</a:t>
             </a:fld>
             <a:endParaRPr lang="en-US"/>
           </a:p>
@@ -3172,7 +3172,7 @@
           <a:p>
             <a:fld id="{016554A5-B4DD-7045-B047-B7DA6D1E70A4}" type="datetimeFigureOut">
               <a:rPr lang="en-US" smtClean="0"/>
-              <a:t>4/29/2022</a:t>
+              <a:t>4/29/22</a:t>
             </a:fld>
             <a:endParaRPr lang="en-US"/>
           </a:p>
@@ -3351,7 +3351,7 @@
           <a:p>
             <a:fld id="{016554A5-B4DD-7045-B047-B7DA6D1E70A4}" type="datetimeFigureOut">
               <a:rPr lang="en-US" smtClean="0"/>
-              <a:t>4/29/2022</a:t>
+              <a:t>4/29/22</a:t>
             </a:fld>
             <a:endParaRPr lang="en-US"/>
           </a:p>
@@ -3464,7 +3464,7 @@
           <a:p>
             <a:fld id="{016554A5-B4DD-7045-B047-B7DA6D1E70A4}" type="datetimeFigureOut">
               <a:rPr lang="en-US" smtClean="0"/>
-              <a:t>4/29/2022</a:t>
+              <a:t>4/29/22</a:t>
             </a:fld>
             <a:endParaRPr lang="en-US"/>
           </a:p>
@@ -4012,7 +4012,7 @@
           <a:p>
             <a:fld id="{016554A5-B4DD-7045-B047-B7DA6D1E70A4}" type="datetimeFigureOut">
               <a:rPr lang="en-US" smtClean="0"/>
-              <a:t>4/29/2022</a:t>
+              <a:t>4/29/22</a:t>
             </a:fld>
             <a:endParaRPr lang="en-US"/>
           </a:p>
@@ -5248,94 +5248,73 @@
           <a:chExt cx="0" cy="0"/>
         </a:xfrm>
       </p:grpSpPr>
-      <p:sp>
-        <p:nvSpPr>
-          <p:cNvPr id="4" name="Title 3">
-            <a:extLst>
-              <a:ext uri="{FF2B5EF4-FFF2-40B4-BE49-F238E27FC236}">
-                <a16:creationId xmlns:a16="http://schemas.microsoft.com/office/drawing/2014/main" id="{096CCFBC-CEEA-8445-9C0A-80973839FEA5}"/>
-              </a:ext>
-            </a:extLst>
-          </p:cNvPr>
-          <p:cNvSpPr>
-            <a:spLocks noGrp="1"/>
-          </p:cNvSpPr>
-          <p:nvPr>
-            <p:ph type="title"/>
-          </p:nvPr>
-        </p:nvSpPr>
+      <p:pic>
+        <p:nvPicPr>
+          <p:cNvPr id="5" name="Online Media 4" descr="ECE 4180 Demo">
+            <a:hlinkClick r:id="" action="ppaction://media"/>
+            <a:extLst>
+              <a:ext uri="{FF2B5EF4-FFF2-40B4-BE49-F238E27FC236}">
+                <a16:creationId xmlns:a16="http://schemas.microsoft.com/office/drawing/2014/main" id="{600FA1B2-F058-F64B-A778-ACB28FFFB86B}"/>
+              </a:ext>
+            </a:extLst>
+          </p:cNvPr>
+          <p:cNvPicPr>
+            <a:picLocks noGrp="1" noRot="1" noChangeAspect="1"/>
+          </p:cNvPicPr>
+          <p:nvPr>
+            <p:ph idx="1"/>
+            <a:videoFile r:link="rId1"/>
+          </p:nvPr>
+        </p:nvPicPr>
+        <p:blipFill>
+          <a:blip r:embed="rId3"/>
+          <a:stretch>
+            <a:fillRect/>
+          </a:stretch>
+        </p:blipFill>
         <p:spPr>
+          <a:xfrm>
+            <a:off x="724607" y="1215484"/>
+            <a:ext cx="7694785" cy="4347554"/>
+          </a:xfrm>
           <a:prstGeom prst="rect">
             <a:avLst/>
           </a:prstGeom>
+          <a:noFill/>
         </p:spPr>
-        <p:txBody>
-          <a:bodyPr>
+      </p:pic>
+      <p:sp>
+        <p:nvSpPr>
+          <p:cNvPr id="4" name="Title 3">
+            <a:extLst>
+              <a:ext uri="{FF2B5EF4-FFF2-40B4-BE49-F238E27FC236}">
+                <a16:creationId xmlns:a16="http://schemas.microsoft.com/office/drawing/2014/main" id="{096CCFBC-CEEA-8445-9C0A-80973839FEA5}"/>
+              </a:ext>
+            </a:extLst>
+          </p:cNvPr>
+          <p:cNvSpPr>
+            <a:spLocks noGrp="1"/>
+          </p:cNvSpPr>
+          <p:nvPr>
+            <p:ph type="title"/>
+          </p:nvPr>
+        </p:nvSpPr>
+        <p:spPr>
+          <a:xfrm>
+            <a:off x="285750" y="200721"/>
+            <a:ext cx="8572500" cy="1014761"/>
+          </a:xfrm>
+        </p:spPr>
+        <p:txBody>
+          <a:bodyPr anchor="ctr">
             <a:normAutofit/>
           </a:bodyPr>
           <a:lstStyle/>
           <a:p>
             <a:r>
-              <a:rPr lang="en-US" sz="3000" dirty="0">
-                <a:solidFill>
-                  <a:srgbClr val="A7934B"/>
-                </a:solidFill>
-                <a:latin typeface="Roboto" panose="02000000000000000000" pitchFamily="2" charset="0"/>
-                <a:ea typeface="Roboto" panose="02000000000000000000" pitchFamily="2" charset="0"/>
-                <a:cs typeface="Roboto" panose="02000000000000000000" pitchFamily="2" charset="0"/>
-              </a:rPr>
+              <a:rPr lang="en-US"/>
               <a:t>Demo </a:t>
             </a:r>
-          </a:p>
-        </p:txBody>
-      </p:sp>
-      <p:sp>
-        <p:nvSpPr>
-          <p:cNvPr id="2" name="Content Placeholder 1">
-            <a:extLst>
-              <a:ext uri="{FF2B5EF4-FFF2-40B4-BE49-F238E27FC236}">
-                <a16:creationId xmlns:a16="http://schemas.microsoft.com/office/drawing/2014/main" id="{92586D75-D4A2-47B4-A3A2-06282CC5E563}"/>
-              </a:ext>
-            </a:extLst>
-          </p:cNvPr>
-          <p:cNvSpPr>
-            <a:spLocks noGrp="1"/>
-          </p:cNvSpPr>
-          <p:nvPr>
-            <p:ph sz="half" idx="1"/>
-          </p:nvPr>
-        </p:nvSpPr>
-        <p:spPr/>
-        <p:txBody>
-          <a:bodyPr/>
-          <a:lstStyle/>
-          <a:p>
-            <a:endParaRPr lang="en-US"/>
-          </a:p>
-        </p:txBody>
-      </p:sp>
-      <p:sp>
-        <p:nvSpPr>
-          <p:cNvPr id="3" name="Content Placeholder 2">
-            <a:extLst>
-              <a:ext uri="{FF2B5EF4-FFF2-40B4-BE49-F238E27FC236}">
-                <a16:creationId xmlns:a16="http://schemas.microsoft.com/office/drawing/2014/main" id="{B8ABE47D-F163-4BBC-A4F5-81896608844F}"/>
-              </a:ext>
-            </a:extLst>
-          </p:cNvPr>
-          <p:cNvSpPr>
-            <a:spLocks noGrp="1"/>
-          </p:cNvSpPr>
-          <p:nvPr>
-            <p:ph sz="half" idx="2"/>
-          </p:nvPr>
-        </p:nvSpPr>
-        <p:spPr/>
-        <p:txBody>
-          <a:bodyPr/>
-          <a:lstStyle/>
-          <a:p>
-            <a:endParaRPr lang="en-US"/>
           </a:p>
         </p:txBody>
       </p:sp>
@@ -5349,6 +5328,141 @@
   <p:clrMapOvr>
     <a:masterClrMapping/>
   </p:clrMapOvr>
+  <p:timing>
+    <p:tnLst>
+      <p:par>
+        <p:cTn id="1" dur="indefinite" restart="never" nodeType="tmRoot">
+          <p:childTnLst>
+            <p:seq concurrent="1" nextAc="seek">
+              <p:cTn id="2" dur="indefinite" nodeType="mainSeq">
+                <p:childTnLst>
+                  <p:par>
+                    <p:cTn id="3" fill="hold">
+                      <p:stCondLst>
+                        <p:cond delay="indefinite"/>
+                      </p:stCondLst>
+                      <p:childTnLst>
+                        <p:par>
+                          <p:cTn id="4" fill="hold">
+                            <p:stCondLst>
+                              <p:cond delay="0"/>
+                            </p:stCondLst>
+                            <p:childTnLst>
+                              <p:par>
+                                <p:cTn id="5" presetID="1" presetClass="mediacall" presetSubtype="0" fill="hold" nodeType="clickEffect">
+                                  <p:stCondLst>
+                                    <p:cond delay="0"/>
+                                  </p:stCondLst>
+                                  <p:childTnLst>
+                                    <p:cmd type="call" cmd="playFrom(0.0)">
+                                      <p:cBhvr>
+                                        <p:cTn id="6" dur="1" fill="hold"/>
+                                        <p:tgtEl>
+                                          <p:spTgt spid="5"/>
+                                        </p:tgtEl>
+                                      </p:cBhvr>
+                                    </p:cmd>
+                                  </p:childTnLst>
+                                </p:cTn>
+                              </p:par>
+                            </p:childTnLst>
+                          </p:cTn>
+                        </p:par>
+                      </p:childTnLst>
+                    </p:cTn>
+                  </p:par>
+                </p:childTnLst>
+              </p:cTn>
+              <p:prevCondLst>
+                <p:cond evt="onPrev" delay="0">
+                  <p:tgtEl>
+                    <p:sldTgt/>
+                  </p:tgtEl>
+                </p:cond>
+              </p:prevCondLst>
+              <p:nextCondLst>
+                <p:cond evt="onNext" delay="0">
+                  <p:tgtEl>
+                    <p:sldTgt/>
+                  </p:tgtEl>
+                </p:cond>
+              </p:nextCondLst>
+            </p:seq>
+            <p:video>
+              <p:cMediaNode vol="80000">
+                <p:cTn id="7" fill="hold" display="0">
+                  <p:stCondLst>
+                    <p:cond delay="indefinite"/>
+                  </p:stCondLst>
+                </p:cTn>
+                <p:tgtEl>
+                  <p:spTgt spid="5"/>
+                </p:tgtEl>
+              </p:cMediaNode>
+            </p:video>
+            <p:seq concurrent="1" nextAc="seek">
+              <p:cTn id="8" restart="whenNotActive" fill="hold" evtFilter="cancelBubble" nodeType="interactiveSeq">
+                <p:stCondLst>
+                  <p:cond evt="onClick" delay="0">
+                    <p:tgtEl>
+                      <p:spTgt spid="5"/>
+                    </p:tgtEl>
+                  </p:cond>
+                </p:stCondLst>
+                <p:endSync evt="end" delay="0">
+                  <p:rtn val="all"/>
+                </p:endSync>
+                <p:childTnLst>
+                  <p:par>
+                    <p:cTn id="9" fill="hold">
+                      <p:stCondLst>
+                        <p:cond delay="0"/>
+                      </p:stCondLst>
+                      <p:childTnLst>
+                        <p:par>
+                          <p:cTn id="10" fill="hold">
+                            <p:stCondLst>
+                              <p:cond delay="0"/>
+                            </p:stCondLst>
+                            <p:childTnLst>
+                              <p:par>
+                                <p:cTn id="11" presetID="2" presetClass="mediacall" presetSubtype="0" fill="hold" nodeType="clickEffect">
+                                  <p:stCondLst>
+                                    <p:cond delay="0"/>
+                                  </p:stCondLst>
+                                  <p:childTnLst>
+                                    <p:cmd type="call" cmd="togglePause">
+                                      <p:cBhvr>
+                                        <p:cTn id="12" dur="1" fill="hold"/>
+                                        <p:tgtEl>
+                                          <p:spTgt spid="5"/>
+                                        </p:tgtEl>
+                                      </p:cBhvr>
+                                    </p:cmd>
+                                  </p:childTnLst>
+                                </p:cTn>
+                              </p:par>
+                            </p:childTnLst>
+                          </p:cTn>
+                        </p:par>
+                      </p:childTnLst>
+                    </p:cTn>
+                  </p:par>
+                </p:childTnLst>
+              </p:cTn>
+              <p:nextCondLst>
+                <p:cond evt="onClick" delay="0">
+                  <p:tgtEl>
+                    <p:spTgt spid="5"/>
+                  </p:tgtEl>
+                </p:cond>
+              </p:nextCondLst>
+            </p:seq>
+          </p:childTnLst>
+        </p:cTn>
+      </p:par>
+    </p:tnLst>
+  </p:timing>
 </p:sld>
 </file>
 

</xml_diff>